<commit_message>
update docs/dp_franchise_pizza_stores.pptx for factor method description
</commit_message>
<xml_diff>
--- a/smart-pizza-store_factory-part2/docs/dp_franchise_pizza_stores.pptx
+++ b/smart-pizza-store_factory-part2/docs/dp_franchise_pizza_stores.pptx
@@ -10,7 +10,8 @@
     <p:sldId id="259" r:id="rId4"/>
     <p:sldId id="260" r:id="rId5"/>
     <p:sldId id="261" r:id="rId6"/>
-    <p:sldId id="257" r:id="rId7"/>
+    <p:sldId id="262" r:id="rId7"/>
+    <p:sldId id="257" r:id="rId8"/>
   </p:sldIdLst>
   <p:sldSz cx="12192000" cy="6858000"/>
   <p:notesSz cx="6858000" cy="9144000"/>
@@ -264,7 +265,7 @@
           <a:p>
             <a:fld id="{E30E316F-0DE1-4060-95B5-F59FE25FF644}" type="datetimeFigureOut">
               <a:rPr lang="zh-TW" altLang="en-US" smtClean="0"/>
-              <a:t>2022/3/7</a:t>
+              <a:t>2022/3/8</a:t>
             </a:fld>
             <a:endParaRPr lang="zh-TW" altLang="en-US"/>
           </a:p>
@@ -462,7 +463,7 @@
           <a:p>
             <a:fld id="{E30E316F-0DE1-4060-95B5-F59FE25FF644}" type="datetimeFigureOut">
               <a:rPr lang="zh-TW" altLang="en-US" smtClean="0"/>
-              <a:t>2022/3/7</a:t>
+              <a:t>2022/3/8</a:t>
             </a:fld>
             <a:endParaRPr lang="zh-TW" altLang="en-US"/>
           </a:p>
@@ -670,7 +671,7 @@
           <a:p>
             <a:fld id="{E30E316F-0DE1-4060-95B5-F59FE25FF644}" type="datetimeFigureOut">
               <a:rPr lang="zh-TW" altLang="en-US" smtClean="0"/>
-              <a:t>2022/3/7</a:t>
+              <a:t>2022/3/8</a:t>
             </a:fld>
             <a:endParaRPr lang="zh-TW" altLang="en-US"/>
           </a:p>
@@ -868,7 +869,7 @@
           <a:p>
             <a:fld id="{E30E316F-0DE1-4060-95B5-F59FE25FF644}" type="datetimeFigureOut">
               <a:rPr lang="zh-TW" altLang="en-US" smtClean="0"/>
-              <a:t>2022/3/7</a:t>
+              <a:t>2022/3/8</a:t>
             </a:fld>
             <a:endParaRPr lang="zh-TW" altLang="en-US"/>
           </a:p>
@@ -1143,7 +1144,7 @@
           <a:p>
             <a:fld id="{E30E316F-0DE1-4060-95B5-F59FE25FF644}" type="datetimeFigureOut">
               <a:rPr lang="zh-TW" altLang="en-US" smtClean="0"/>
-              <a:t>2022/3/7</a:t>
+              <a:t>2022/3/8</a:t>
             </a:fld>
             <a:endParaRPr lang="zh-TW" altLang="en-US"/>
           </a:p>
@@ -1408,7 +1409,7 @@
           <a:p>
             <a:fld id="{E30E316F-0DE1-4060-95B5-F59FE25FF644}" type="datetimeFigureOut">
               <a:rPr lang="zh-TW" altLang="en-US" smtClean="0"/>
-              <a:t>2022/3/7</a:t>
+              <a:t>2022/3/8</a:t>
             </a:fld>
             <a:endParaRPr lang="zh-TW" altLang="en-US"/>
           </a:p>
@@ -1820,7 +1821,7 @@
           <a:p>
             <a:fld id="{E30E316F-0DE1-4060-95B5-F59FE25FF644}" type="datetimeFigureOut">
               <a:rPr lang="zh-TW" altLang="en-US" smtClean="0"/>
-              <a:t>2022/3/7</a:t>
+              <a:t>2022/3/8</a:t>
             </a:fld>
             <a:endParaRPr lang="zh-TW" altLang="en-US"/>
           </a:p>
@@ -1961,7 +1962,7 @@
           <a:p>
             <a:fld id="{E30E316F-0DE1-4060-95B5-F59FE25FF644}" type="datetimeFigureOut">
               <a:rPr lang="zh-TW" altLang="en-US" smtClean="0"/>
-              <a:t>2022/3/7</a:t>
+              <a:t>2022/3/8</a:t>
             </a:fld>
             <a:endParaRPr lang="zh-TW" altLang="en-US"/>
           </a:p>
@@ -2074,7 +2075,7 @@
           <a:p>
             <a:fld id="{E30E316F-0DE1-4060-95B5-F59FE25FF644}" type="datetimeFigureOut">
               <a:rPr lang="zh-TW" altLang="en-US" smtClean="0"/>
-              <a:t>2022/3/7</a:t>
+              <a:t>2022/3/8</a:t>
             </a:fld>
             <a:endParaRPr lang="zh-TW" altLang="en-US"/>
           </a:p>
@@ -2385,7 +2386,7 @@
           <a:p>
             <a:fld id="{E30E316F-0DE1-4060-95B5-F59FE25FF644}" type="datetimeFigureOut">
               <a:rPr lang="zh-TW" altLang="en-US" smtClean="0"/>
-              <a:t>2022/3/7</a:t>
+              <a:t>2022/3/8</a:t>
             </a:fld>
             <a:endParaRPr lang="zh-TW" altLang="en-US"/>
           </a:p>
@@ -2673,7 +2674,7 @@
           <a:p>
             <a:fld id="{E30E316F-0DE1-4060-95B5-F59FE25FF644}" type="datetimeFigureOut">
               <a:rPr lang="zh-TW" altLang="en-US" smtClean="0"/>
-              <a:t>2022/3/7</a:t>
+              <a:t>2022/3/8</a:t>
             </a:fld>
             <a:endParaRPr lang="zh-TW" altLang="en-US"/>
           </a:p>
@@ -2914,7 +2915,7 @@
           <a:p>
             <a:fld id="{E30E316F-0DE1-4060-95B5-F59FE25FF644}" type="datetimeFigureOut">
               <a:rPr lang="zh-TW" altLang="en-US" smtClean="0"/>
-              <a:t>2022/3/7</a:t>
+              <a:t>2022/3/8</a:t>
             </a:fld>
             <a:endParaRPr lang="zh-TW" altLang="en-US"/>
           </a:p>
@@ -3385,6 +3386,12 @@
               <a:rPr lang="en-US" altLang="zh-TW" dirty="0"/>
               <a:t>SimpleFactory</a:t>
             </a:r>
+          </a:p>
+          <a:p>
+            <a:r>
+              <a:rPr lang="en-US" altLang="zh-TW" dirty="0"/>
+              <a:t>Factory method</a:t>
+            </a:r>
             <a:endParaRPr lang="zh-TW" altLang="en-US" dirty="0"/>
           </a:p>
         </p:txBody>
@@ -3913,8 +3920,8 @@
         </p:nvSpPr>
         <p:spPr>
           <a:xfrm>
-            <a:off x="7220046" y="129867"/>
-            <a:ext cx="4765472" cy="707886"/>
+            <a:off x="3714161" y="129867"/>
+            <a:ext cx="8276903" cy="707886"/>
           </a:xfrm>
           <a:prstGeom prst="rect">
             <a:avLst/>
@@ -3922,7 +3929,7 @@
           <a:noFill/>
         </p:spPr>
         <p:txBody>
-          <a:bodyPr wrap="none" lIns="91440" tIns="45720" rIns="91440" bIns="45720">
+          <a:bodyPr wrap="square" lIns="91440" tIns="45720" rIns="91440" bIns="45720">
             <a:spAutoFit/>
           </a:bodyPr>
           <a:lstStyle/>
@@ -3986,32 +3993,64 @@
               </a:rPr>
               <a:t>a stores</a:t>
             </a:r>
-            <a:endParaRPr lang="zh-TW" altLang="en-US" sz="4000" b="1" cap="none" spc="0" dirty="0">
-              <a:ln w="12700">
-                <a:solidFill>
-                  <a:schemeClr val="accent1"/>
-                </a:solidFill>
-                <a:prstDash val="solid"/>
-              </a:ln>
-              <a:pattFill prst="pct75">
-                <a:fgClr>
-                  <a:schemeClr val="accent2">
-                    <a:lumMod val="50000"/>
-                  </a:schemeClr>
-                </a:fgClr>
-                <a:bgClr>
-                  <a:schemeClr val="accent1">
-                    <a:lumMod val="20000"/>
-                    <a:lumOff val="80000"/>
-                  </a:schemeClr>
-                </a:bgClr>
-              </a:pattFill>
-              <a:effectLst>
-                <a:outerShdw dist="38100" dir="2640000" algn="bl" rotWithShape="0">
-                  <a:srgbClr val="FFC000"/>
-                </a:outerShdw>
-              </a:effectLst>
-            </a:endParaRPr>
+            <a:r>
+              <a:rPr lang="zh-TW" altLang="en-US" sz="4000" b="1" dirty="0">
+                <a:ln w="12700">
+                  <a:solidFill>
+                    <a:schemeClr val="accent1"/>
+                  </a:solidFill>
+                  <a:prstDash val="solid"/>
+                </a:ln>
+                <a:pattFill prst="pct75">
+                  <a:fgClr>
+                    <a:schemeClr val="accent2">
+                      <a:lumMod val="50000"/>
+                    </a:schemeClr>
+                  </a:fgClr>
+                  <a:bgClr>
+                    <a:schemeClr val="accent1">
+                      <a:lumMod val="20000"/>
+                      <a:lumOff val="80000"/>
+                    </a:schemeClr>
+                  </a:bgClr>
+                </a:pattFill>
+                <a:effectLst>
+                  <a:outerShdw dist="38100" dir="2640000" algn="bl" rotWithShape="0">
+                    <a:srgbClr val="FFC000"/>
+                  </a:outerShdw>
+                </a:effectLst>
+              </a:rPr>
+              <a:t> </a:t>
+            </a:r>
+            <a:r>
+              <a:rPr lang="en-US" altLang="zh-TW" sz="4000" b="1" dirty="0">
+                <a:ln w="12700">
+                  <a:solidFill>
+                    <a:schemeClr val="accent1"/>
+                  </a:solidFill>
+                  <a:prstDash val="solid"/>
+                </a:ln>
+                <a:pattFill prst="pct75">
+                  <a:fgClr>
+                    <a:schemeClr val="accent2">
+                      <a:lumMod val="50000"/>
+                    </a:schemeClr>
+                  </a:fgClr>
+                  <a:bgClr>
+                    <a:schemeClr val="accent1">
+                      <a:lumMod val="20000"/>
+                      <a:lumOff val="80000"/>
+                    </a:schemeClr>
+                  </a:bgClr>
+                </a:pattFill>
+                <a:effectLst>
+                  <a:outerShdw dist="38100" dir="2640000" algn="bl" rotWithShape="0">
+                    <a:srgbClr val="FFC000"/>
+                  </a:outerShdw>
+                </a:effectLst>
+              </a:rPr>
+              <a:t>(simple factory)</a:t>
+            </a:r>
           </a:p>
         </p:txBody>
       </p:sp>
@@ -4083,6 +4122,292 @@
       </p:grpSpPr>
       <p:sp>
         <p:nvSpPr>
+          <p:cNvPr id="4" name="矩形 3">
+            <a:extLst>
+              <a:ext uri="{FF2B5EF4-FFF2-40B4-BE49-F238E27FC236}">
+                <a16:creationId xmlns:a16="http://schemas.microsoft.com/office/drawing/2014/main" id="{3A02057A-CF34-4A2B-8802-BE2714CA2A7B}"/>
+              </a:ext>
+            </a:extLst>
+          </p:cNvPr>
+          <p:cNvSpPr/>
+          <p:nvPr/>
+        </p:nvSpPr>
+        <p:spPr>
+          <a:xfrm>
+            <a:off x="3714161" y="129867"/>
+            <a:ext cx="8276903" cy="707886"/>
+          </a:xfrm>
+          <a:prstGeom prst="rect">
+            <a:avLst/>
+          </a:prstGeom>
+          <a:noFill/>
+        </p:spPr>
+        <p:txBody>
+          <a:bodyPr wrap="square" lIns="91440" tIns="45720" rIns="91440" bIns="45720">
+            <a:spAutoFit/>
+          </a:bodyPr>
+          <a:lstStyle/>
+          <a:p>
+            <a:pPr algn="ctr"/>
+            <a:r>
+              <a:rPr lang="en-US" altLang="zh-TW" sz="4000" b="1" cap="none" spc="0" dirty="0">
+                <a:ln w="12700">
+                  <a:solidFill>
+                    <a:schemeClr val="accent1"/>
+                  </a:solidFill>
+                  <a:prstDash val="solid"/>
+                </a:ln>
+                <a:pattFill prst="pct75">
+                  <a:fgClr>
+                    <a:schemeClr val="accent2">
+                      <a:lumMod val="50000"/>
+                    </a:schemeClr>
+                  </a:fgClr>
+                  <a:bgClr>
+                    <a:schemeClr val="accent1">
+                      <a:lumMod val="20000"/>
+                      <a:lumOff val="80000"/>
+                    </a:schemeClr>
+                  </a:bgClr>
+                </a:pattFill>
+                <a:effectLst>
+                  <a:outerShdw dist="38100" dir="2640000" algn="bl" rotWithShape="0">
+                    <a:srgbClr val="FFC000"/>
+                  </a:outerShdw>
+                </a:effectLst>
+              </a:rPr>
+              <a:t>Franchise pizz</a:t>
+            </a:r>
+            <a:r>
+              <a:rPr lang="en-US" altLang="zh-TW" sz="4000" b="1" dirty="0">
+                <a:ln w="12700">
+                  <a:solidFill>
+                    <a:schemeClr val="accent1"/>
+                  </a:solidFill>
+                  <a:prstDash val="solid"/>
+                </a:ln>
+                <a:pattFill prst="pct75">
+                  <a:fgClr>
+                    <a:schemeClr val="accent2">
+                      <a:lumMod val="50000"/>
+                    </a:schemeClr>
+                  </a:fgClr>
+                  <a:bgClr>
+                    <a:schemeClr val="accent1">
+                      <a:lumMod val="20000"/>
+                      <a:lumOff val="80000"/>
+                    </a:schemeClr>
+                  </a:bgClr>
+                </a:pattFill>
+                <a:effectLst>
+                  <a:outerShdw dist="38100" dir="2640000" algn="bl" rotWithShape="0">
+                    <a:srgbClr val="FFC000"/>
+                  </a:outerShdw>
+                </a:effectLst>
+              </a:rPr>
+              <a:t>a stores</a:t>
+            </a:r>
+            <a:r>
+              <a:rPr lang="zh-TW" altLang="en-US" sz="4000" b="1" dirty="0">
+                <a:ln w="12700">
+                  <a:solidFill>
+                    <a:schemeClr val="accent1"/>
+                  </a:solidFill>
+                  <a:prstDash val="solid"/>
+                </a:ln>
+                <a:pattFill prst="pct75">
+                  <a:fgClr>
+                    <a:schemeClr val="accent2">
+                      <a:lumMod val="50000"/>
+                    </a:schemeClr>
+                  </a:fgClr>
+                  <a:bgClr>
+                    <a:schemeClr val="accent1">
+                      <a:lumMod val="20000"/>
+                      <a:lumOff val="80000"/>
+                    </a:schemeClr>
+                  </a:bgClr>
+                </a:pattFill>
+                <a:effectLst>
+                  <a:outerShdw dist="38100" dir="2640000" algn="bl" rotWithShape="0">
+                    <a:srgbClr val="FFC000"/>
+                  </a:outerShdw>
+                </a:effectLst>
+              </a:rPr>
+              <a:t> </a:t>
+            </a:r>
+            <a:r>
+              <a:rPr lang="en-US" altLang="zh-TW" sz="4000" b="1" dirty="0">
+                <a:ln w="12700">
+                  <a:solidFill>
+                    <a:schemeClr val="accent1"/>
+                  </a:solidFill>
+                  <a:prstDash val="solid"/>
+                </a:ln>
+                <a:pattFill prst="pct75">
+                  <a:fgClr>
+                    <a:schemeClr val="accent2">
+                      <a:lumMod val="50000"/>
+                    </a:schemeClr>
+                  </a:fgClr>
+                  <a:bgClr>
+                    <a:schemeClr val="accent1">
+                      <a:lumMod val="20000"/>
+                      <a:lumOff val="80000"/>
+                    </a:schemeClr>
+                  </a:bgClr>
+                </a:pattFill>
+                <a:effectLst>
+                  <a:outerShdw dist="38100" dir="2640000" algn="bl" rotWithShape="0">
+                    <a:srgbClr val="FFC000"/>
+                  </a:outerShdw>
+                </a:effectLst>
+              </a:rPr>
+              <a:t>(factory method)</a:t>
+            </a:r>
+          </a:p>
+        </p:txBody>
+      </p:sp>
+      <p:pic>
+        <p:nvPicPr>
+          <p:cNvPr id="9" name="圖片 8">
+            <a:extLst>
+              <a:ext uri="{FF2B5EF4-FFF2-40B4-BE49-F238E27FC236}">
+                <a16:creationId xmlns:a16="http://schemas.microsoft.com/office/drawing/2014/main" id="{DE9D1608-CFB4-48E1-AEA0-6DC2E1EB1F23}"/>
+              </a:ext>
+            </a:extLst>
+          </p:cNvPr>
+          <p:cNvPicPr>
+            <a:picLocks noChangeAspect="1"/>
+          </p:cNvPicPr>
+          <p:nvPr/>
+        </p:nvPicPr>
+        <p:blipFill>
+          <a:blip r:embed="rId2">
+            <a:extLst>
+              <a:ext uri="{28A0092B-C50C-407E-A947-70E740481C1C}">
+                <a14:useLocalDpi xmlns:a14="http://schemas.microsoft.com/office/drawing/2010/main" val="0"/>
+              </a:ext>
+            </a:extLst>
+          </a:blip>
+          <a:stretch>
+            <a:fillRect/>
+          </a:stretch>
+        </p:blipFill>
+        <p:spPr>
+          <a:xfrm>
+            <a:off x="3513881" y="790618"/>
+            <a:ext cx="8678119" cy="4978585"/>
+          </a:xfrm>
+          <a:prstGeom prst="rect">
+            <a:avLst/>
+          </a:prstGeom>
+        </p:spPr>
+      </p:pic>
+      <p:pic>
+        <p:nvPicPr>
+          <p:cNvPr id="5" name="圖片 4">
+            <a:extLst>
+              <a:ext uri="{FF2B5EF4-FFF2-40B4-BE49-F238E27FC236}">
+                <a16:creationId xmlns:a16="http://schemas.microsoft.com/office/drawing/2014/main" id="{41FD8CDC-CE16-490D-898F-EEBCD44A99D7}"/>
+              </a:ext>
+            </a:extLst>
+          </p:cNvPr>
+          <p:cNvPicPr>
+            <a:picLocks noChangeAspect="1"/>
+          </p:cNvPicPr>
+          <p:nvPr/>
+        </p:nvPicPr>
+        <p:blipFill>
+          <a:blip r:embed="rId3">
+            <a:extLst>
+              <a:ext uri="{28A0092B-C50C-407E-A947-70E740481C1C}">
+                <a14:useLocalDpi xmlns:a14="http://schemas.microsoft.com/office/drawing/2010/main" val="0"/>
+              </a:ext>
+            </a:extLst>
+          </a:blip>
+          <a:stretch>
+            <a:fillRect/>
+          </a:stretch>
+        </p:blipFill>
+        <p:spPr>
+          <a:xfrm>
+            <a:off x="0" y="5668990"/>
+            <a:ext cx="4547965" cy="1189010"/>
+          </a:xfrm>
+          <a:prstGeom prst="rect">
+            <a:avLst/>
+          </a:prstGeom>
+        </p:spPr>
+      </p:pic>
+      <p:pic>
+        <p:nvPicPr>
+          <p:cNvPr id="11" name="圖片 10">
+            <a:extLst>
+              <a:ext uri="{FF2B5EF4-FFF2-40B4-BE49-F238E27FC236}">
+                <a16:creationId xmlns:a16="http://schemas.microsoft.com/office/drawing/2014/main" id="{86C0873E-B1CD-4142-9B48-C70C68511261}"/>
+              </a:ext>
+            </a:extLst>
+          </p:cNvPr>
+          <p:cNvPicPr>
+            <a:picLocks noChangeAspect="1"/>
+          </p:cNvPicPr>
+          <p:nvPr/>
+        </p:nvPicPr>
+        <p:blipFill>
+          <a:blip r:embed="rId4">
+            <a:extLst>
+              <a:ext uri="{28A0092B-C50C-407E-A947-70E740481C1C}">
+                <a14:useLocalDpi xmlns:a14="http://schemas.microsoft.com/office/drawing/2010/main" val="0"/>
+              </a:ext>
+            </a:extLst>
+          </a:blip>
+          <a:stretch>
+            <a:fillRect/>
+          </a:stretch>
+        </p:blipFill>
+        <p:spPr>
+          <a:xfrm>
+            <a:off x="0" y="2533001"/>
+            <a:ext cx="4139962" cy="2708301"/>
+          </a:xfrm>
+          <a:prstGeom prst="rect">
+            <a:avLst/>
+          </a:prstGeom>
+        </p:spPr>
+      </p:pic>
+    </p:spTree>
+    <p:extLst>
+      <p:ext uri="{BB962C8B-B14F-4D97-AF65-F5344CB8AC3E}">
+        <p14:creationId xmlns:p14="http://schemas.microsoft.com/office/powerpoint/2010/main" val="3318192174"/>
+      </p:ext>
+    </p:extLst>
+  </p:cSld>
+  <p:clrMapOvr>
+    <a:masterClrMapping/>
+  </p:clrMapOvr>
+</p:sld>
+</file>
+
+<file path=ppt/slides/slide7.xml><?xml version="1.0" encoding="utf-8"?>
+<p:sld xmlns:a="http://schemas.openxmlformats.org/drawingml/2006/main" xmlns:r="http://schemas.openxmlformats.org/officeDocument/2006/relationships" xmlns:p="http://schemas.openxmlformats.org/presentationml/2006/main">
+  <p:cSld>
+    <p:spTree>
+      <p:nvGrpSpPr>
+        <p:cNvPr id="1" name=""/>
+        <p:cNvGrpSpPr/>
+        <p:nvPr/>
+      </p:nvGrpSpPr>
+      <p:grpSpPr>
+        <a:xfrm>
+          <a:off x="0" y="0"/>
+          <a:ext cx="0" cy="0"/>
+          <a:chOff x="0" y="0"/>
+          <a:chExt cx="0" cy="0"/>
+        </a:xfrm>
+      </p:grpSpPr>
+      <p:sp>
+        <p:nvSpPr>
           <p:cNvPr id="2" name="標題 1">
             <a:extLst>
               <a:ext uri="{FF2B5EF4-FFF2-40B4-BE49-F238E27FC236}">
@@ -4153,16 +4478,10 @@
           </a:p>
           <a:p>
             <a:r>
-              <a:rPr lang="en-US" altLang="zh-TW" sz="2000" dirty="0" err="1">
-                <a:hlinkClick r:id="rId3"/>
-              </a:rPr>
-              <a:t>iT</a:t>
-            </a:r>
-            <a:r>
               <a:rPr lang="en-US" altLang="zh-TW" sz="2000" dirty="0">
                 <a:hlinkClick r:id="rId3"/>
               </a:rPr>
-              <a:t> </a:t>
+              <a:t>iT </a:t>
             </a:r>
             <a:r>
               <a:rPr lang="zh-TW" altLang="en-US" sz="2000" dirty="0">
@@ -4180,16 +4499,10 @@
           </a:p>
           <a:p>
             <a:r>
-              <a:rPr lang="en-US" altLang="zh-TW" sz="2000" dirty="0" err="1">
-                <a:hlinkClick r:id="rId4"/>
-              </a:rPr>
-              <a:t>RealPython</a:t>
-            </a:r>
-            <a:r>
               <a:rPr lang="en-US" altLang="zh-TW" sz="2000" dirty="0">
                 <a:hlinkClick r:id="rId4"/>
               </a:rPr>
-              <a:t> - The Factory Method Pattern and Its Implementation in Python</a:t>
+              <a:t>RealPython - The Factory Method Pattern and Its Implementation in Python</a:t>
             </a:r>
             <a:endParaRPr lang="zh-TW" altLang="en-US" sz="2000" dirty="0"/>
           </a:p>

</xml_diff>